<commit_message>
added a note in slides week 4
</commit_message>
<xml_diff>
--- a/Slides/Week 4 - Binary trees.pptx
+++ b/Slides/Week 4 - Binary trees.pptx
@@ -252,7 +252,7 @@
           <a:p>
             <a:fld id="{F58F4026-CF18-472A-B4DE-F2B442FB8B54}" type="datetimeFigureOut">
               <a:rPr lang="en-GB" smtClean="0"/>
-              <a:t>03/12/2015</a:t>
+              <a:t>04/12/2015</a:t>
             </a:fld>
             <a:endParaRPr lang="en-GB"/>
           </a:p>
@@ -1336,7 +1336,7 @@
                   </a:prstClr>
                 </a:solidFill>
               </a:rPr>
-              <a:t>03/12/2015</a:t>
+              <a:t>04/12/2015</a:t>
             </a:fld>
             <a:endParaRPr lang="en-GB">
               <a:solidFill>
@@ -1628,7 +1628,7 @@
                   </a:prstClr>
                 </a:solidFill>
               </a:rPr>
-              <a:t>03/12/2015</a:t>
+              <a:t>04/12/2015</a:t>
             </a:fld>
             <a:endParaRPr lang="en-GB">
               <a:solidFill>
@@ -1983,7 +1983,7 @@
                   </a:prstClr>
                 </a:solidFill>
               </a:rPr>
-              <a:t>03/12/2015</a:t>
+              <a:t>04/12/2015</a:t>
             </a:fld>
             <a:endParaRPr lang="en-GB">
               <a:solidFill>
@@ -2347,7 +2347,7 @@
                   </a:prstClr>
                 </a:solidFill>
               </a:rPr>
-              <a:t>03/12/2015</a:t>
+              <a:t>04/12/2015</a:t>
             </a:fld>
             <a:endParaRPr lang="en-GB">
               <a:solidFill>
@@ -2702,7 +2702,7 @@
                   </a:prstClr>
                 </a:solidFill>
               </a:rPr>
-              <a:t>03/12/2015</a:t>
+              <a:t>04/12/2015</a:t>
             </a:fld>
             <a:endParaRPr lang="en-GB">
               <a:solidFill>
@@ -3126,7 +3126,7 @@
                   </a:prstClr>
                 </a:solidFill>
               </a:rPr>
-              <a:t>03/12/2015</a:t>
+              <a:t>04/12/2015</a:t>
             </a:fld>
             <a:endParaRPr lang="en-GB">
               <a:solidFill>
@@ -3337,7 +3337,7 @@
                   </a:prstClr>
                 </a:solidFill>
               </a:rPr>
-              <a:t>03/12/2015</a:t>
+              <a:t>04/12/2015</a:t>
             </a:fld>
             <a:endParaRPr lang="en-GB">
               <a:solidFill>
@@ -3558,7 +3558,7 @@
                   </a:prstClr>
                 </a:solidFill>
               </a:rPr>
-              <a:t>03/12/2015</a:t>
+              <a:t>04/12/2015</a:t>
             </a:fld>
             <a:endParaRPr lang="en-GB">
               <a:solidFill>
@@ -3769,7 +3769,7 @@
                   </a:prstClr>
                 </a:solidFill>
               </a:rPr>
-              <a:t>03/12/2015</a:t>
+              <a:t>04/12/2015</a:t>
             </a:fld>
             <a:endParaRPr lang="en-GB">
               <a:solidFill>
@@ -4057,7 +4057,7 @@
                   </a:prstClr>
                 </a:solidFill>
               </a:rPr>
-              <a:t>03/12/2015</a:t>
+              <a:t>04/12/2015</a:t>
             </a:fld>
             <a:endParaRPr lang="en-GB">
               <a:solidFill>
@@ -4330,7 +4330,7 @@
                   </a:prstClr>
                 </a:solidFill>
               </a:rPr>
-              <a:t>03/12/2015</a:t>
+              <a:t>04/12/2015</a:t>
             </a:fld>
             <a:endParaRPr lang="en-GB">
               <a:solidFill>
@@ -4745,7 +4745,7 @@
                   </a:prstClr>
                 </a:solidFill>
               </a:rPr>
-              <a:t>03/12/2015</a:t>
+              <a:t>04/12/2015</a:t>
             </a:fld>
             <a:endParaRPr lang="en-GB">
               <a:solidFill>
@@ -4909,7 +4909,7 @@
                   </a:prstClr>
                 </a:solidFill>
               </a:rPr>
-              <a:t>03/12/2015</a:t>
+              <a:t>04/12/2015</a:t>
             </a:fld>
             <a:endParaRPr lang="en-GB">
               <a:solidFill>
@@ -5045,7 +5045,7 @@
                   </a:prstClr>
                 </a:solidFill>
               </a:rPr>
-              <a:t>03/12/2015</a:t>
+              <a:t>04/12/2015</a:t>
             </a:fld>
             <a:endParaRPr lang="en-GB">
               <a:solidFill>
@@ -5341,7 +5341,7 @@
                   </a:prstClr>
                 </a:solidFill>
               </a:rPr>
-              <a:t>03/12/2015</a:t>
+              <a:t>04/12/2015</a:t>
             </a:fld>
             <a:endParaRPr lang="en-GB">
               <a:solidFill>
@@ -5645,7 +5645,7 @@
                   </a:prstClr>
                 </a:solidFill>
               </a:rPr>
-              <a:t>03/12/2015</a:t>
+              <a:t>04/12/2015</a:t>
             </a:fld>
             <a:endParaRPr lang="en-GB">
               <a:solidFill>
@@ -6431,7 +6431,7 @@
                   </a:prstClr>
                 </a:solidFill>
               </a:rPr>
-              <a:t>03/12/2015</a:t>
+              <a:t>04/12/2015</a:t>
             </a:fld>
             <a:endParaRPr lang="en-GB">
               <a:solidFill>
@@ -7113,7 +7113,6 @@
               <a:rPr lang="en-GB" sz="2000" dirty="0"/>
               <a:t> – Office H4.204</a:t>
             </a:r>
-            <a:endParaRPr lang="en-GB" sz="2000" dirty="0"/>
           </a:p>
         </p:txBody>
       </p:sp>
@@ -8578,8 +8577,8 @@
           </a:p>
         </p:txBody>
       </p:sp>
-      <mc:AlternateContent xmlns:mc="http://schemas.openxmlformats.org/markup-compatibility/2006">
-        <mc:Choice xmlns:a14="http://schemas.microsoft.com/office/drawing/2010/main" Requires="a14">
+      <mc:AlternateContent xmlns:mc="http://schemas.openxmlformats.org/markup-compatibility/2006" xmlns:a14="http://schemas.microsoft.com/office/drawing/2010/main">
+        <mc:Choice Requires="a14">
           <p:sp>
             <p:nvSpPr>
               <p:cNvPr id="3" name="Content Placeholder 2"/>
@@ -8604,11 +8603,7 @@
               <a:p>
                 <a:r>
                   <a:rPr lang="en-US" dirty="0" smtClean="0"/>
-                  <a:t>Consider </a:t>
-                </a:r>
-                <a:r>
-                  <a:rPr lang="en-US" dirty="0" smtClean="0"/>
-                  <a:t>the full binary tree of height </a:t>
+                  <a:t>Consider the full binary tree of height </a:t>
                 </a:r>
                 <a14:m>
                   <m:oMath xmlns:m="http://schemas.openxmlformats.org/officeDocument/2006/math">
@@ -9434,7 +9429,7 @@
             </p:txBody>
           </p:sp>
         </mc:Choice>
-        <mc:Fallback>
+        <mc:Fallback xmlns="">
           <p:sp>
             <p:nvSpPr>
               <p:cNvPr id="3" name="Content Placeholder 2"/>
@@ -9603,8 +9598,8 @@
           </a:p>
         </p:txBody>
       </p:sp>
-      <mc:AlternateContent xmlns:mc="http://schemas.openxmlformats.org/markup-compatibility/2006">
-        <mc:Choice xmlns:a14="http://schemas.microsoft.com/office/drawing/2010/main" Requires="a14">
+      <mc:AlternateContent xmlns:mc="http://schemas.openxmlformats.org/markup-compatibility/2006" xmlns:a14="http://schemas.microsoft.com/office/drawing/2010/main">
+        <mc:Choice Requires="a14">
           <p:sp>
             <p:nvSpPr>
               <p:cNvPr id="3" name="Content Placeholder 2"/>
@@ -9767,7 +9762,7 @@
             </p:txBody>
           </p:sp>
         </mc:Choice>
-        <mc:Fallback>
+        <mc:Fallback xmlns="">
           <p:sp>
             <p:nvSpPr>
               <p:cNvPr id="3" name="Content Placeholder 2"/>
@@ -14223,8 +14218,8 @@
           </a:p>
         </p:txBody>
       </p:sp>
-      <mc:AlternateContent xmlns:mc="http://schemas.openxmlformats.org/markup-compatibility/2006">
-        <mc:Choice xmlns:a14="http://schemas.microsoft.com/office/drawing/2010/main" Requires="a14">
+      <mc:AlternateContent xmlns:mc="http://schemas.openxmlformats.org/markup-compatibility/2006" xmlns:a14="http://schemas.microsoft.com/office/drawing/2010/main">
+        <mc:Choice Requires="a14">
           <p:sp>
             <p:nvSpPr>
               <p:cNvPr id="3" name="Tijdelijke aanduiding voor inhoud 2"/>
@@ -14472,7 +14467,7 @@
             </p:txBody>
           </p:sp>
         </mc:Choice>
-        <mc:Fallback>
+        <mc:Fallback xmlns="">
           <p:sp>
             <p:nvSpPr>
               <p:cNvPr id="3" name="Tijdelijke aanduiding voor inhoud 2"/>
@@ -23066,8 +23061,8 @@
           </a:p>
         </p:txBody>
       </p:sp>
-      <mc:AlternateContent xmlns:mc="http://schemas.openxmlformats.org/markup-compatibility/2006">
-        <mc:Choice xmlns:a14="http://schemas.microsoft.com/office/drawing/2010/main" Requires="a14">
+      <mc:AlternateContent xmlns:mc="http://schemas.openxmlformats.org/markup-compatibility/2006" xmlns:a14="http://schemas.microsoft.com/office/drawing/2010/main">
+        <mc:Choice Requires="a14">
           <p:sp>
             <p:nvSpPr>
               <p:cNvPr id="3" name="Tijdelijke aanduiding voor inhoud 2"/>
@@ -23368,7 +23363,7 @@
             </p:txBody>
           </p:sp>
         </mc:Choice>
-        <mc:Fallback>
+        <mc:Fallback xmlns="">
           <p:sp>
             <p:nvSpPr>
               <p:cNvPr id="3" name="Tijdelijke aanduiding voor inhoud 2"/>
@@ -23441,8 +23436,8 @@
           </a:p>
         </p:txBody>
       </p:sp>
-      <mc:AlternateContent xmlns:mc="http://schemas.openxmlformats.org/markup-compatibility/2006">
-        <mc:Choice xmlns:a14="http://schemas.microsoft.com/office/drawing/2010/main" Requires="a14">
+      <mc:AlternateContent xmlns:mc="http://schemas.openxmlformats.org/markup-compatibility/2006" xmlns:a14="http://schemas.microsoft.com/office/drawing/2010/main">
+        <mc:Choice Requires="a14">
           <p:graphicFrame>
             <p:nvGraphicFramePr>
               <p:cNvPr id="5" name="Table 4"/>
@@ -23931,7 +23926,7 @@
             </a:graphic>
           </p:graphicFrame>
         </mc:Choice>
-        <mc:Fallback>
+        <mc:Fallback xmlns="">
           <p:graphicFrame>
             <p:nvGraphicFramePr>
               <p:cNvPr id="5" name="Table 4"/>
@@ -24215,18 +24210,14 @@
           <a:p>
             <a:r>
               <a:rPr lang="en-GB" dirty="0" smtClean="0"/>
-              <a:t>BST </a:t>
-            </a:r>
-            <a:r>
-              <a:rPr lang="en-GB" dirty="0" smtClean="0"/>
-              <a:t>in .NET</a:t>
+              <a:t>BST in .NET</a:t>
             </a:r>
             <a:endParaRPr lang="en-GB" dirty="0"/>
           </a:p>
         </p:txBody>
       </p:sp>
-      <mc:AlternateContent xmlns:mc="http://schemas.openxmlformats.org/markup-compatibility/2006">
-        <mc:Choice xmlns:a14="http://schemas.microsoft.com/office/drawing/2010/main" Requires="a14">
+      <mc:AlternateContent xmlns:mc="http://schemas.openxmlformats.org/markup-compatibility/2006" xmlns:a14="http://schemas.microsoft.com/office/drawing/2010/main">
+        <mc:Choice Requires="a14">
           <p:sp>
             <p:nvSpPr>
               <p:cNvPr id="3" name="Content Placeholder 2"/>
@@ -24363,7 +24354,7 @@
             </p:txBody>
           </p:sp>
         </mc:Choice>
-        <mc:Fallback>
+        <mc:Fallback xmlns="">
           <p:sp>
             <p:nvSpPr>
               <p:cNvPr id="3" name="Content Placeholder 2"/>
@@ -24606,8 +24597,8 @@
           </a:p>
         </p:txBody>
       </p:sp>
-      <mc:AlternateContent xmlns:mc="http://schemas.openxmlformats.org/markup-compatibility/2006">
-        <mc:Choice xmlns:a14="http://schemas.microsoft.com/office/drawing/2010/main" Requires="a14">
+      <mc:AlternateContent xmlns:mc="http://schemas.openxmlformats.org/markup-compatibility/2006" xmlns:a14="http://schemas.microsoft.com/office/drawing/2010/main">
+        <mc:Choice Requires="a14">
           <p:sp>
             <p:nvSpPr>
               <p:cNvPr id="3" name="Tijdelijke aanduiding voor inhoud 2"/>
@@ -24794,7 +24785,7 @@
             </p:txBody>
           </p:sp>
         </mc:Choice>
-        <mc:Fallback>
+        <mc:Fallback xmlns="">
           <p:sp>
             <p:nvSpPr>
               <p:cNvPr id="3" name="Tijdelijke aanduiding voor inhoud 2"/>
@@ -27637,12 +27628,23 @@
                 </a14:m>
                 <a:r>
                   <a:rPr lang="en-US" dirty="0" smtClean="0"/>
-                  <a:t> from a house… this is exactly a range search, where the </a:t>
+                  <a:t> from a house… this is exactly a range search, </a:t>
+                </a:r>
+                <a:r>
+                  <a:rPr lang="en-US" dirty="0" smtClean="0">
+                    <a:solidFill>
+                      <a:srgbClr val="FF0000"/>
+                    </a:solidFill>
+                  </a:rPr>
+                  <a:t>where the </a:t>
                 </a:r>
                 <a14:m>
                   <m:oMath xmlns:m="http://schemas.openxmlformats.org/officeDocument/2006/math">
                     <m:r>
                       <a:rPr lang="nl-NL" b="0" i="1" smtClean="0">
+                        <a:solidFill>
+                          <a:srgbClr val="FF0000"/>
+                        </a:solidFill>
                         <a:latin typeface="Cambria Math" panose="02040503050406030204" pitchFamily="18" charset="0"/>
                       </a:rPr>
                       <m:t>𝑥</m:t>
@@ -27650,53 +27652,100 @@
                   </m:oMath>
                 </a14:m>
                 <a:r>
-                  <a:rPr lang="nl-NL" dirty="0" smtClean="0"/>
+                  <a:rPr lang="nl-NL" dirty="0" smtClean="0">
+                    <a:solidFill>
+                      <a:srgbClr val="FF0000"/>
+                    </a:solidFill>
+                  </a:rPr>
                   <a:t> </a:t>
                 </a:r>
                 <a:r>
-                  <a:rPr lang="nl-NL" dirty="0" err="1" smtClean="0"/>
+                  <a:rPr lang="nl-NL" dirty="0" err="1" smtClean="0">
+                    <a:solidFill>
+                      <a:srgbClr val="FF0000"/>
+                    </a:solidFill>
+                  </a:rPr>
                   <a:t>coordinate</a:t>
                 </a:r>
                 <a:r>
-                  <a:rPr lang="nl-NL" dirty="0" smtClean="0"/>
+                  <a:rPr lang="nl-NL" dirty="0" smtClean="0">
+                    <a:solidFill>
+                      <a:srgbClr val="FF0000"/>
+                    </a:solidFill>
+                  </a:rPr>
                   <a:t> of </a:t>
                 </a:r>
                 <a:r>
-                  <a:rPr lang="nl-NL" dirty="0" err="1" smtClean="0"/>
+                  <a:rPr lang="nl-NL" dirty="0" err="1" smtClean="0">
+                    <a:solidFill>
+                      <a:srgbClr val="FF0000"/>
+                    </a:solidFill>
+                  </a:rPr>
                   <a:t>the</a:t>
                 </a:r>
                 <a:r>
-                  <a:rPr lang="nl-NL" dirty="0" smtClean="0"/>
+                  <a:rPr lang="nl-NL" dirty="0" smtClean="0">
+                    <a:solidFill>
+                      <a:srgbClr val="FF0000"/>
+                    </a:solidFill>
+                  </a:rPr>
                   <a:t> building </a:t>
                 </a:r>
                 <a:r>
-                  <a:rPr lang="nl-NL" dirty="0" err="1" smtClean="0"/>
+                  <a:rPr lang="nl-NL" dirty="0" err="1" smtClean="0">
+                    <a:solidFill>
+                      <a:srgbClr val="FF0000"/>
+                    </a:solidFill>
+                  </a:rPr>
                   <a:t>should</a:t>
                 </a:r>
                 <a:r>
-                  <a:rPr lang="nl-NL" dirty="0" smtClean="0"/>
+                  <a:rPr lang="nl-NL" dirty="0" smtClean="0">
+                    <a:solidFill>
+                      <a:srgbClr val="FF0000"/>
+                    </a:solidFill>
+                  </a:rPr>
                   <a:t> </a:t>
                 </a:r>
                 <a:r>
-                  <a:rPr lang="nl-NL" dirty="0" err="1" smtClean="0"/>
+                  <a:rPr lang="nl-NL" dirty="0" err="1" smtClean="0">
+                    <a:solidFill>
+                      <a:srgbClr val="FF0000"/>
+                    </a:solidFill>
+                  </a:rPr>
                   <a:t>be</a:t>
                 </a:r>
                 <a:r>
-                  <a:rPr lang="nl-NL" dirty="0" smtClean="0"/>
+                  <a:rPr lang="nl-NL" dirty="0" smtClean="0">
+                    <a:solidFill>
+                      <a:srgbClr val="FF0000"/>
+                    </a:solidFill>
+                  </a:rPr>
                   <a:t> </a:t>
                 </a:r>
                 <a:r>
-                  <a:rPr lang="nl-NL" dirty="0" err="1" smtClean="0"/>
+                  <a:rPr lang="nl-NL" dirty="0" err="1" smtClean="0">
+                    <a:solidFill>
+                      <a:srgbClr val="FF0000"/>
+                    </a:solidFill>
+                  </a:rPr>
                   <a:t>between</a:t>
                 </a:r>
                 <a:r>
-                  <a:rPr lang="nl-NL" dirty="0" smtClean="0"/>
+                  <a:rPr lang="nl-NL" dirty="0" smtClean="0">
+                    <a:solidFill>
+                      <a:srgbClr val="FF0000"/>
+                    </a:solidFill>
+                  </a:rPr>
                   <a:t> </a:t>
                 </a:r>
                 <a14:m>
                   <m:oMath xmlns:m="http://schemas.openxmlformats.org/officeDocument/2006/math">
                     <m:r>
                       <a:rPr lang="nl-NL" b="0" i="0" smtClean="0">
+                        <a:solidFill>
+                          <a:srgbClr val="FF0000"/>
+                        </a:solidFill>
                         <a:latin typeface="Cambria Math" panose="02040503050406030204" pitchFamily="18" charset="0"/>
                       </a:rPr>
                       <m:t>[</m:t>
@@ -27705,6 +27754,9 @@
                       <m:sSubPr>
                         <m:ctrlPr>
                           <a:rPr lang="nl-NL" b="0" i="1" smtClean="0">
+                            <a:solidFill>
+                              <a:srgbClr val="FF0000"/>
+                            </a:solidFill>
                             <a:latin typeface="Cambria Math" panose="02040503050406030204" pitchFamily="18" charset="0"/>
                           </a:rPr>
                         </m:ctrlPr>
@@ -27712,6 +27764,9 @@
                       <m:e>
                         <m:r>
                           <a:rPr lang="nl-NL" b="0" i="1" smtClean="0">
+                            <a:solidFill>
+                              <a:srgbClr val="FF0000"/>
+                            </a:solidFill>
                             <a:latin typeface="Cambria Math" panose="02040503050406030204" pitchFamily="18" charset="0"/>
                           </a:rPr>
                           <m:t>𝑥</m:t>
@@ -27720,6 +27775,9 @@
                       <m:sub>
                         <m:r>
                           <a:rPr lang="nl-NL" b="0" i="1" smtClean="0">
+                            <a:solidFill>
+                              <a:srgbClr val="FF0000"/>
+                            </a:solidFill>
                             <a:latin typeface="Cambria Math" panose="02040503050406030204" pitchFamily="18" charset="0"/>
                           </a:rPr>
                           <m:t>h</m:t>
@@ -27728,18 +27786,27 @@
                     </m:sSub>
                     <m:r>
                       <a:rPr lang="nl-NL" b="0" i="1" smtClean="0">
+                        <a:solidFill>
+                          <a:srgbClr val="FF0000"/>
+                        </a:solidFill>
                         <a:latin typeface="Cambria Math" panose="02040503050406030204" pitchFamily="18" charset="0"/>
                       </a:rPr>
                       <m:t>−</m:t>
                     </m:r>
                     <m:r>
                       <a:rPr lang="nl-NL" b="0" i="1" smtClean="0">
+                        <a:solidFill>
+                          <a:srgbClr val="FF0000"/>
+                        </a:solidFill>
                         <a:latin typeface="Cambria Math" panose="02040503050406030204" pitchFamily="18" charset="0"/>
                       </a:rPr>
                       <m:t>𝑑</m:t>
                     </m:r>
                     <m:r>
                       <a:rPr lang="nl-NL" b="0" i="1" smtClean="0">
+                        <a:solidFill>
+                          <a:srgbClr val="FF0000"/>
+                        </a:solidFill>
                         <a:latin typeface="Cambria Math" panose="02040503050406030204" pitchFamily="18" charset="0"/>
                       </a:rPr>
                       <m:t>,</m:t>
@@ -27748,6 +27815,9 @@
                       <m:sSubPr>
                         <m:ctrlPr>
                           <a:rPr lang="nl-NL" b="0" i="1" smtClean="0">
+                            <a:solidFill>
+                              <a:srgbClr val="FF0000"/>
+                            </a:solidFill>
                             <a:latin typeface="Cambria Math" panose="02040503050406030204" pitchFamily="18" charset="0"/>
                           </a:rPr>
                         </m:ctrlPr>
@@ -27755,6 +27825,9 @@
                       <m:e>
                         <m:r>
                           <a:rPr lang="nl-NL" b="0" i="1" smtClean="0">
+                            <a:solidFill>
+                              <a:srgbClr val="FF0000"/>
+                            </a:solidFill>
                             <a:latin typeface="Cambria Math" panose="02040503050406030204" pitchFamily="18" charset="0"/>
                           </a:rPr>
                           <m:t>𝑥</m:t>
@@ -27763,6 +27836,9 @@
                       <m:sub>
                         <m:r>
                           <a:rPr lang="nl-NL" b="0" i="1" smtClean="0">
+                            <a:solidFill>
+                              <a:srgbClr val="FF0000"/>
+                            </a:solidFill>
                             <a:latin typeface="Cambria Math" panose="02040503050406030204" pitchFamily="18" charset="0"/>
                           </a:rPr>
                           <m:t>h</m:t>
@@ -27771,18 +27847,27 @@
                     </m:sSub>
                     <m:r>
                       <a:rPr lang="nl-NL" b="0" i="1" smtClean="0">
+                        <a:solidFill>
+                          <a:srgbClr val="FF0000"/>
+                        </a:solidFill>
                         <a:latin typeface="Cambria Math" panose="02040503050406030204" pitchFamily="18" charset="0"/>
                       </a:rPr>
                       <m:t>+</m:t>
                     </m:r>
                     <m:r>
                       <a:rPr lang="nl-NL" b="0" i="1" smtClean="0">
+                        <a:solidFill>
+                          <a:srgbClr val="FF0000"/>
+                        </a:solidFill>
                         <a:latin typeface="Cambria Math" panose="02040503050406030204" pitchFamily="18" charset="0"/>
                       </a:rPr>
                       <m:t>𝑑</m:t>
                     </m:r>
                     <m:r>
                       <a:rPr lang="nl-NL" b="0" i="1" smtClean="0">
+                        <a:solidFill>
+                          <a:srgbClr val="FF0000"/>
+                        </a:solidFill>
                         <a:latin typeface="Cambria Math" panose="02040503050406030204" pitchFamily="18" charset="0"/>
                       </a:rPr>
                       <m:t>]</m:t>
@@ -27790,29 +27875,52 @@
                   </m:oMath>
                 </a14:m>
                 <a:r>
-                  <a:rPr lang="nl-NL" dirty="0" smtClean="0"/>
+                  <a:rPr lang="nl-NL" dirty="0" smtClean="0">
+                    <a:solidFill>
+                      <a:srgbClr val="FF0000"/>
+                    </a:solidFill>
+                  </a:rPr>
                   <a:t> </a:t>
                 </a:r>
                 <a:r>
-                  <a:rPr lang="nl-NL" u="sng" dirty="0" err="1" smtClean="0"/>
+                  <a:rPr lang="nl-NL" u="sng" dirty="0" err="1" smtClean="0">
+                    <a:solidFill>
+                      <a:srgbClr val="FF0000"/>
+                    </a:solidFill>
+                  </a:rPr>
                   <a:t>and</a:t>
                 </a:r>
                 <a:r>
-                  <a:rPr lang="nl-NL" dirty="0" smtClean="0"/>
+                  <a:rPr lang="nl-NL" dirty="0" smtClean="0">
+                    <a:solidFill>
+                      <a:srgbClr val="FF0000"/>
+                    </a:solidFill>
+                  </a:rPr>
                   <a:t> </a:t>
                 </a:r>
                 <a:r>
-                  <a:rPr lang="nl-NL" dirty="0" err="1" smtClean="0"/>
+                  <a:rPr lang="nl-NL" dirty="0" err="1" smtClean="0">
+                    <a:solidFill>
+                      <a:srgbClr val="FF0000"/>
+                    </a:solidFill>
+                  </a:rPr>
                   <a:t>the</a:t>
                 </a:r>
                 <a:r>
-                  <a:rPr lang="nl-NL" dirty="0" smtClean="0"/>
+                  <a:rPr lang="nl-NL" dirty="0" smtClean="0">
+                    <a:solidFill>
+                      <a:srgbClr val="FF0000"/>
+                    </a:solidFill>
+                  </a:rPr>
                   <a:t> </a:t>
                 </a:r>
                 <a14:m>
                   <m:oMath xmlns:m="http://schemas.openxmlformats.org/officeDocument/2006/math">
                     <m:r>
                       <a:rPr lang="nl-NL" b="0" i="1" smtClean="0">
+                        <a:solidFill>
+                          <a:srgbClr val="FF0000"/>
+                        </a:solidFill>
                         <a:latin typeface="Cambria Math" panose="02040503050406030204" pitchFamily="18" charset="0"/>
                       </a:rPr>
                       <m:t>𝑦</m:t>
@@ -27820,29 +27928,52 @@
                   </m:oMath>
                 </a14:m>
                 <a:r>
-                  <a:rPr lang="nl-NL" dirty="0" smtClean="0"/>
+                  <a:rPr lang="nl-NL" dirty="0" smtClean="0">
+                    <a:solidFill>
+                      <a:srgbClr val="FF0000"/>
+                    </a:solidFill>
+                  </a:rPr>
                   <a:t> </a:t>
                 </a:r>
                 <a:r>
-                  <a:rPr lang="nl-NL" dirty="0" err="1" smtClean="0"/>
+                  <a:rPr lang="nl-NL" dirty="0" err="1" smtClean="0">
+                    <a:solidFill>
+                      <a:srgbClr val="FF0000"/>
+                    </a:solidFill>
+                  </a:rPr>
                   <a:t>coordinate</a:t>
                 </a:r>
                 <a:r>
-                  <a:rPr lang="nl-NL" dirty="0" smtClean="0"/>
+                  <a:rPr lang="nl-NL" dirty="0" smtClean="0">
+                    <a:solidFill>
+                      <a:srgbClr val="FF0000"/>
+                    </a:solidFill>
+                  </a:rPr>
                   <a:t> </a:t>
                 </a:r>
                 <a:r>
-                  <a:rPr lang="nl-NL" dirty="0" err="1" smtClean="0"/>
+                  <a:rPr lang="nl-NL" dirty="0" err="1" smtClean="0">
+                    <a:solidFill>
+                      <a:srgbClr val="FF0000"/>
+                    </a:solidFill>
+                  </a:rPr>
                   <a:t>between</a:t>
                 </a:r>
                 <a:r>
-                  <a:rPr lang="nl-NL" dirty="0" smtClean="0"/>
+                  <a:rPr lang="nl-NL" dirty="0" smtClean="0">
+                    <a:solidFill>
+                      <a:srgbClr val="FF0000"/>
+                    </a:solidFill>
+                  </a:rPr>
                   <a:t> </a:t>
                 </a:r>
                 <a14:m>
                   <m:oMath xmlns:m="http://schemas.openxmlformats.org/officeDocument/2006/math">
                     <m:r>
                       <a:rPr lang="nl-NL" b="0" i="1" smtClean="0">
+                        <a:solidFill>
+                          <a:srgbClr val="FF0000"/>
+                        </a:solidFill>
                         <a:latin typeface="Cambria Math" panose="02040503050406030204" pitchFamily="18" charset="0"/>
                       </a:rPr>
                       <m:t>[</m:t>
@@ -27851,6 +27982,9 @@
                       <m:sSubPr>
                         <m:ctrlPr>
                           <a:rPr lang="nl-NL" b="0" i="1" smtClean="0">
+                            <a:solidFill>
+                              <a:srgbClr val="FF0000"/>
+                            </a:solidFill>
                             <a:latin typeface="Cambria Math" panose="02040503050406030204" pitchFamily="18" charset="0"/>
                           </a:rPr>
                         </m:ctrlPr>
@@ -27858,6 +27992,9 @@
                       <m:e>
                         <m:r>
                           <a:rPr lang="nl-NL" b="0" i="1" smtClean="0">
+                            <a:solidFill>
+                              <a:srgbClr val="FF0000"/>
+                            </a:solidFill>
                             <a:latin typeface="Cambria Math" panose="02040503050406030204" pitchFamily="18" charset="0"/>
                           </a:rPr>
                           <m:t>𝑦</m:t>
@@ -27866,6 +28003,9 @@
                       <m:sub>
                         <m:r>
                           <a:rPr lang="nl-NL" b="0" i="1" smtClean="0">
+                            <a:solidFill>
+                              <a:srgbClr val="FF0000"/>
+                            </a:solidFill>
                             <a:latin typeface="Cambria Math" panose="02040503050406030204" pitchFamily="18" charset="0"/>
                           </a:rPr>
                           <m:t>h</m:t>
@@ -27874,18 +28014,27 @@
                     </m:sSub>
                     <m:r>
                       <a:rPr lang="nl-NL" b="0" i="1" smtClean="0">
+                        <a:solidFill>
+                          <a:srgbClr val="FF0000"/>
+                        </a:solidFill>
                         <a:latin typeface="Cambria Math" panose="02040503050406030204" pitchFamily="18" charset="0"/>
                       </a:rPr>
                       <m:t>−</m:t>
                     </m:r>
                     <m:r>
                       <a:rPr lang="nl-NL" b="0" i="1" smtClean="0">
+                        <a:solidFill>
+                          <a:srgbClr val="FF0000"/>
+                        </a:solidFill>
                         <a:latin typeface="Cambria Math" panose="02040503050406030204" pitchFamily="18" charset="0"/>
                       </a:rPr>
                       <m:t>𝑑</m:t>
                     </m:r>
                     <m:r>
                       <a:rPr lang="nl-NL" b="0" i="1" smtClean="0">
+                        <a:solidFill>
+                          <a:srgbClr val="FF0000"/>
+                        </a:solidFill>
                         <a:latin typeface="Cambria Math" panose="02040503050406030204" pitchFamily="18" charset="0"/>
                       </a:rPr>
                       <m:t>, </m:t>
@@ -27894,6 +28043,9 @@
                       <m:sSubPr>
                         <m:ctrlPr>
                           <a:rPr lang="nl-NL" b="0" i="1" smtClean="0">
+                            <a:solidFill>
+                              <a:srgbClr val="FF0000"/>
+                            </a:solidFill>
                             <a:latin typeface="Cambria Math" panose="02040503050406030204" pitchFamily="18" charset="0"/>
                           </a:rPr>
                         </m:ctrlPr>
@@ -27901,6 +28053,9 @@
                       <m:e>
                         <m:r>
                           <a:rPr lang="nl-NL" b="0" i="1" smtClean="0">
+                            <a:solidFill>
+                              <a:srgbClr val="FF0000"/>
+                            </a:solidFill>
                             <a:latin typeface="Cambria Math" panose="02040503050406030204" pitchFamily="18" charset="0"/>
                           </a:rPr>
                           <m:t>𝑦</m:t>
@@ -27909,6 +28064,9 @@
                       <m:sub>
                         <m:r>
                           <a:rPr lang="nl-NL" b="0" i="1" smtClean="0">
+                            <a:solidFill>
+                              <a:srgbClr val="FF0000"/>
+                            </a:solidFill>
                             <a:latin typeface="Cambria Math" panose="02040503050406030204" pitchFamily="18" charset="0"/>
                           </a:rPr>
                           <m:t>h</m:t>
@@ -27917,18 +28075,27 @@
                     </m:sSub>
                     <m:r>
                       <a:rPr lang="nl-NL" b="0" i="1" smtClean="0">
+                        <a:solidFill>
+                          <a:srgbClr val="FF0000"/>
+                        </a:solidFill>
                         <a:latin typeface="Cambria Math" panose="02040503050406030204" pitchFamily="18" charset="0"/>
                       </a:rPr>
                       <m:t>+</m:t>
                     </m:r>
                     <m:r>
                       <a:rPr lang="nl-NL" b="0" i="1" smtClean="0">
+                        <a:solidFill>
+                          <a:srgbClr val="FF0000"/>
+                        </a:solidFill>
                         <a:latin typeface="Cambria Math" panose="02040503050406030204" pitchFamily="18" charset="0"/>
                       </a:rPr>
                       <m:t>𝑑</m:t>
                     </m:r>
                     <m:r>
                       <a:rPr lang="nl-NL" b="0" i="1" smtClean="0">
+                        <a:solidFill>
+                          <a:srgbClr val="FF0000"/>
+                        </a:solidFill>
                         <a:latin typeface="Cambria Math" panose="02040503050406030204" pitchFamily="18" charset="0"/>
                       </a:rPr>
                       <m:t>]</m:t>
@@ -27936,8 +28103,16 @@
                   </m:oMath>
                 </a14:m>
                 <a:r>
+                  <a:rPr lang="nl-NL" dirty="0" smtClean="0">
+                    <a:solidFill>
+                      <a:srgbClr val="FF0000"/>
+                    </a:solidFill>
+                  </a:rPr>
+                  <a:t> </a:t>
+                </a:r>
+                <a:r>
                   <a:rPr lang="nl-NL" dirty="0" smtClean="0"/>
-                  <a:t> (</a:t>
+                  <a:t>(</a:t>
                 </a:r>
                 <a:r>
                   <a:rPr lang="nl-NL" dirty="0" err="1" smtClean="0"/>
@@ -28349,23 +28524,7 @@
                   <a:srgbClr val="FF0000"/>
                 </a:solidFill>
               </a:rPr>
-              <a:t>GO </a:t>
-            </a:r>
-            <a:r>
-              <a:rPr lang="en-GB" sz="2400" b="1" i="1" dirty="0" smtClean="0">
-                <a:solidFill>
-                  <a:srgbClr val="FF0000"/>
-                </a:solidFill>
-              </a:rPr>
-              <a:t>ON </a:t>
-            </a:r>
-            <a:r>
-              <a:rPr lang="en-GB" sz="2400" b="1" i="1" dirty="0" smtClean="0">
-                <a:solidFill>
-                  <a:srgbClr val="FF0000"/>
-                </a:solidFill>
-              </a:rPr>
-              <a:t>WITH THE ASSIGNMENT!!!</a:t>
+              <a:t>GO ON WITH THE ASSIGNMENT!!!</a:t>
             </a:r>
           </a:p>
           <a:p>
@@ -28672,8 +28831,8 @@
           </a:p>
         </p:txBody>
       </p:sp>
-      <mc:AlternateContent xmlns:mc="http://schemas.openxmlformats.org/markup-compatibility/2006">
-        <mc:Choice xmlns:a14="http://schemas.microsoft.com/office/drawing/2010/main" Requires="a14">
+      <mc:AlternateContent xmlns:mc="http://schemas.openxmlformats.org/markup-compatibility/2006" xmlns:a14="http://schemas.microsoft.com/office/drawing/2010/main">
+        <mc:Choice Requires="a14">
           <p:sp>
             <p:nvSpPr>
               <p:cNvPr id="3" name="Content Placeholder 2"/>
@@ -29051,7 +29210,7 @@
             </p:txBody>
           </p:sp>
         </mc:Choice>
-        <mc:Fallback>
+        <mc:Fallback xmlns="">
           <p:sp>
             <p:nvSpPr>
               <p:cNvPr id="3" name="Content Placeholder 2"/>
@@ -29672,8 +29831,8 @@
           </a:p>
         </p:txBody>
       </p:sp>
-      <mc:AlternateContent xmlns:mc="http://schemas.openxmlformats.org/markup-compatibility/2006">
-        <mc:Choice xmlns:a14="http://schemas.microsoft.com/office/drawing/2010/main" Requires="a14">
+      <mc:AlternateContent xmlns:mc="http://schemas.openxmlformats.org/markup-compatibility/2006" xmlns:a14="http://schemas.microsoft.com/office/drawing/2010/main">
+        <mc:Choice Requires="a14">
           <p:sp>
             <p:nvSpPr>
               <p:cNvPr id="3" name="Content Placeholder 2"/>
@@ -29828,15 +29987,7 @@
                       <a:schemeClr val="tx1"/>
                     </a:solidFill>
                   </a:rPr>
-                  <a:t>Root </a:t>
-                </a:r>
-                <a:r>
-                  <a:rPr lang="en-GB" b="1" dirty="0" smtClean="0">
-                    <a:solidFill>
-                      <a:schemeClr val="tx1"/>
-                    </a:solidFill>
-                  </a:rPr>
-                  <a:t>path </a:t>
+                  <a:t>Root path </a:t>
                 </a:r>
                 <a:r>
                   <a:rPr lang="en-GB" dirty="0" smtClean="0">
@@ -29962,15 +30113,7 @@
                       <a:schemeClr val="tx1"/>
                     </a:solidFill>
                   </a:rPr>
-                  <a:t> </a:t>
-                </a:r>
-                <a:r>
-                  <a:rPr lang="en-GB" dirty="0" smtClean="0">
-                    <a:solidFill>
-                      <a:schemeClr val="tx1"/>
-                    </a:solidFill>
-                  </a:rPr>
-                  <a:t>of a node  </a:t>
+                  <a:t> of a node  </a:t>
                 </a:r>
               </a:p>
               <a:p>
@@ -29991,7 +30134,7 @@
             </p:txBody>
           </p:sp>
         </mc:Choice>
-        <mc:Fallback>
+        <mc:Fallback xmlns="">
           <p:sp>
             <p:nvSpPr>
               <p:cNvPr id="3" name="Content Placeholder 2"/>

</xml_diff>